<commit_message>
Updated presentation and demos
</commit_message>
<xml_diff>
--- a/Presentation.pptx
+++ b/Presentation.pptx
@@ -253,7 +253,7 @@
           <a:p>
             <a:fld id="{0F9C471C-5CEB-41C5-B26F-30EBC0FE28CB}" type="datetimeFigureOut">
               <a:rPr lang="en-US" smtClean="0"/>
-              <a:t>5/19/2020</a:t>
+              <a:t>5/21/2020</a:t>
             </a:fld>
             <a:endParaRPr lang="en-US"/>
           </a:p>
@@ -840,7 +840,7 @@
           <a:noFill/>
           <a:extLst>
             <a:ext uri="{909E8E84-426E-40dd-AFC4-6F175D3DCCD1}">
-              <a14:hiddenFill xmlns="" xmlns:a14="http://schemas.microsoft.com/office/drawing/2010/main">
+              <a14:hiddenFill xmlns:a14="http://schemas.microsoft.com/office/drawing/2010/main" xmlns="">
                 <a:solidFill>
                   <a:srgbClr val="FFFFFF"/>
                 </a:solidFill>
@@ -900,7 +900,7 @@
             </a:ln>
             <a:extLst>
               <a:ext uri="{91240B29-F687-4f45-9708-019B960494DF}">
-                <a14:hiddenLine xmlns="" xmlns:a14="http://schemas.microsoft.com/office/drawing/2010/main" w="9525">
+                <a14:hiddenLine xmlns:a14="http://schemas.microsoft.com/office/drawing/2010/main" xmlns="" w="9525">
                   <a:solidFill>
                     <a:srgbClr val="000000"/>
                   </a:solidFill>
@@ -990,7 +990,7 @@
             </a:ln>
             <a:extLst>
               <a:ext uri="{91240B29-F687-4f45-9708-019B960494DF}">
-                <a14:hiddenLine xmlns="" xmlns:a14="http://schemas.microsoft.com/office/drawing/2010/main" w="9525">
+                <a14:hiddenLine xmlns:a14="http://schemas.microsoft.com/office/drawing/2010/main" xmlns="" w="9525">
                   <a:solidFill>
                     <a:srgbClr val="000000"/>
                   </a:solidFill>
@@ -1080,7 +1080,7 @@
             </a:ln>
             <a:extLst>
               <a:ext uri="{91240B29-F687-4f45-9708-019B960494DF}">
-                <a14:hiddenLine xmlns="" xmlns:a14="http://schemas.microsoft.com/office/drawing/2010/main" w="9525">
+                <a14:hiddenLine xmlns:a14="http://schemas.microsoft.com/office/drawing/2010/main" xmlns="" w="9525">
                   <a:solidFill>
                     <a:srgbClr val="000000"/>
                   </a:solidFill>
@@ -1114,7 +1114,7 @@
             </a:ln>
             <a:extLst>
               <a:ext uri="{91240B29-F687-4f45-9708-019B960494DF}">
-                <a14:hiddenLine xmlns="" xmlns:a14="http://schemas.microsoft.com/office/drawing/2010/main" w="9525">
+                <a14:hiddenLine xmlns:a14="http://schemas.microsoft.com/office/drawing/2010/main" xmlns="" w="9525">
                   <a:solidFill>
                     <a:srgbClr val="000000"/>
                   </a:solidFill>
@@ -1204,7 +1204,7 @@
             </a:ln>
             <a:extLst>
               <a:ext uri="{91240B29-F687-4f45-9708-019B960494DF}">
-                <a14:hiddenLine xmlns="" xmlns:a14="http://schemas.microsoft.com/office/drawing/2010/main" w="9525">
+                <a14:hiddenLine xmlns:a14="http://schemas.microsoft.com/office/drawing/2010/main" xmlns="" w="9525">
                   <a:solidFill>
                     <a:srgbClr val="000000"/>
                   </a:solidFill>
@@ -1266,7 +1266,7 @@
             </a:ln>
             <a:extLst>
               <a:ext uri="{91240B29-F687-4f45-9708-019B960494DF}">
-                <a14:hiddenLine xmlns="" xmlns:a14="http://schemas.microsoft.com/office/drawing/2010/main" w="9525">
+                <a14:hiddenLine xmlns:a14="http://schemas.microsoft.com/office/drawing/2010/main" xmlns="" w="9525">
                   <a:solidFill>
                     <a:srgbClr val="000000"/>
                   </a:solidFill>
@@ -1328,7 +1328,7 @@
             </a:ln>
             <a:extLst>
               <a:ext uri="{91240B29-F687-4f45-9708-019B960494DF}">
-                <a14:hiddenLine xmlns="" xmlns:a14="http://schemas.microsoft.com/office/drawing/2010/main" w="9525">
+                <a14:hiddenLine xmlns:a14="http://schemas.microsoft.com/office/drawing/2010/main" xmlns="" w="9525">
                   <a:solidFill>
                     <a:srgbClr val="000000"/>
                   </a:solidFill>
@@ -1418,7 +1418,7 @@
             </a:ln>
             <a:extLst>
               <a:ext uri="{91240B29-F687-4f45-9708-019B960494DF}">
-                <a14:hiddenLine xmlns="" xmlns:a14="http://schemas.microsoft.com/office/drawing/2010/main" w="9525">
+                <a14:hiddenLine xmlns:a14="http://schemas.microsoft.com/office/drawing/2010/main" xmlns="" w="9525">
                   <a:solidFill>
                     <a:srgbClr val="000000"/>
                   </a:solidFill>
@@ -1480,7 +1480,7 @@
             </a:ln>
             <a:extLst>
               <a:ext uri="{91240B29-F687-4f45-9708-019B960494DF}">
-                <a14:hiddenLine xmlns="" xmlns:a14="http://schemas.microsoft.com/office/drawing/2010/main" w="9525">
+                <a14:hiddenLine xmlns:a14="http://schemas.microsoft.com/office/drawing/2010/main" xmlns="" w="9525">
                   <a:solidFill>
                     <a:srgbClr val="000000"/>
                   </a:solidFill>
@@ -1542,7 +1542,7 @@
             </a:ln>
             <a:extLst>
               <a:ext uri="{91240B29-F687-4f45-9708-019B960494DF}">
-                <a14:hiddenLine xmlns="" xmlns:a14="http://schemas.microsoft.com/office/drawing/2010/main" w="9525">
+                <a14:hiddenLine xmlns:a14="http://schemas.microsoft.com/office/drawing/2010/main" xmlns="" w="9525">
                   <a:solidFill>
                     <a:srgbClr val="000000"/>
                   </a:solidFill>
@@ -1632,7 +1632,7 @@
             </a:ln>
             <a:extLst>
               <a:ext uri="{91240B29-F687-4f45-9708-019B960494DF}">
-                <a14:hiddenLine xmlns="" xmlns:a14="http://schemas.microsoft.com/office/drawing/2010/main" w="9525">
+                <a14:hiddenLine xmlns:a14="http://schemas.microsoft.com/office/drawing/2010/main" xmlns="" w="9525">
                   <a:solidFill>
                     <a:srgbClr val="000000"/>
                   </a:solidFill>
@@ -1722,7 +1722,7 @@
             </a:ln>
             <a:extLst>
               <a:ext uri="{91240B29-F687-4f45-9708-019B960494DF}">
-                <a14:hiddenLine xmlns="" xmlns:a14="http://schemas.microsoft.com/office/drawing/2010/main" w="9525">
+                <a14:hiddenLine xmlns:a14="http://schemas.microsoft.com/office/drawing/2010/main" xmlns="" w="9525">
                   <a:solidFill>
                     <a:srgbClr val="000000"/>
                   </a:solidFill>
@@ -1784,7 +1784,7 @@
             </a:ln>
             <a:extLst>
               <a:ext uri="{91240B29-F687-4f45-9708-019B960494DF}">
-                <a14:hiddenLine xmlns="" xmlns:a14="http://schemas.microsoft.com/office/drawing/2010/main" w="9525">
+                <a14:hiddenLine xmlns:a14="http://schemas.microsoft.com/office/drawing/2010/main" xmlns="" w="9525">
                   <a:solidFill>
                     <a:srgbClr val="000000"/>
                   </a:solidFill>
@@ -1894,7 +1894,7 @@
             </a:ln>
             <a:extLst>
               <a:ext uri="{91240B29-F687-4f45-9708-019B960494DF}">
-                <a14:hiddenLine xmlns="" xmlns:a14="http://schemas.microsoft.com/office/drawing/2010/main" w="9525">
+                <a14:hiddenLine xmlns:a14="http://schemas.microsoft.com/office/drawing/2010/main" xmlns="" w="9525">
                   <a:solidFill>
                     <a:srgbClr val="000000"/>
                   </a:solidFill>
@@ -1956,7 +1956,7 @@
             </a:ln>
             <a:extLst>
               <a:ext uri="{91240B29-F687-4f45-9708-019B960494DF}">
-                <a14:hiddenLine xmlns="" xmlns:a14="http://schemas.microsoft.com/office/drawing/2010/main" w="9525">
+                <a14:hiddenLine xmlns:a14="http://schemas.microsoft.com/office/drawing/2010/main" xmlns="" w="9525">
                   <a:solidFill>
                     <a:srgbClr val="000000"/>
                   </a:solidFill>
@@ -2046,7 +2046,7 @@
             </a:ln>
             <a:extLst>
               <a:ext uri="{91240B29-F687-4f45-9708-019B960494DF}">
-                <a14:hiddenLine xmlns="" xmlns:a14="http://schemas.microsoft.com/office/drawing/2010/main" w="9525">
+                <a14:hiddenLine xmlns:a14="http://schemas.microsoft.com/office/drawing/2010/main" xmlns="" w="9525">
                   <a:solidFill>
                     <a:srgbClr val="000000"/>
                   </a:solidFill>
@@ -2136,7 +2136,7 @@
             </a:ln>
             <a:extLst>
               <a:ext uri="{91240B29-F687-4f45-9708-019B960494DF}">
-                <a14:hiddenLine xmlns="" xmlns:a14="http://schemas.microsoft.com/office/drawing/2010/main" w="9525">
+                <a14:hiddenLine xmlns:a14="http://schemas.microsoft.com/office/drawing/2010/main" xmlns="" w="9525">
                   <a:solidFill>
                     <a:srgbClr val="000000"/>
                   </a:solidFill>
@@ -2198,7 +2198,7 @@
             </a:ln>
             <a:extLst>
               <a:ext uri="{91240B29-F687-4f45-9708-019B960494DF}">
-                <a14:hiddenLine xmlns="" xmlns:a14="http://schemas.microsoft.com/office/drawing/2010/main" w="9525">
+                <a14:hiddenLine xmlns:a14="http://schemas.microsoft.com/office/drawing/2010/main" xmlns="" w="9525">
                   <a:solidFill>
                     <a:srgbClr val="000000"/>
                   </a:solidFill>
@@ -2288,7 +2288,7 @@
             </a:ln>
             <a:extLst>
               <a:ext uri="{91240B29-F687-4f45-9708-019B960494DF}">
-                <a14:hiddenLine xmlns="" xmlns:a14="http://schemas.microsoft.com/office/drawing/2010/main" w="9525">
+                <a14:hiddenLine xmlns:a14="http://schemas.microsoft.com/office/drawing/2010/main" xmlns="" w="9525">
                   <a:solidFill>
                     <a:srgbClr val="000000"/>
                   </a:solidFill>
@@ -2378,7 +2378,7 @@
             </a:ln>
             <a:extLst>
               <a:ext uri="{91240B29-F687-4f45-9708-019B960494DF}">
-                <a14:hiddenLine xmlns="" xmlns:a14="http://schemas.microsoft.com/office/drawing/2010/main" w="9525">
+                <a14:hiddenLine xmlns:a14="http://schemas.microsoft.com/office/drawing/2010/main" xmlns="" w="9525">
                   <a:solidFill>
                     <a:srgbClr val="000000"/>
                   </a:solidFill>
@@ -2434,7 +2434,7 @@
             </a:ln>
             <a:extLst>
               <a:ext uri="{91240B29-F687-4f45-9708-019B960494DF}">
-                <a14:hiddenLine xmlns="" xmlns:a14="http://schemas.microsoft.com/office/drawing/2010/main" w="9525">
+                <a14:hiddenLine xmlns:a14="http://schemas.microsoft.com/office/drawing/2010/main" xmlns="" w="9525">
                   <a:solidFill>
                     <a:srgbClr val="000000"/>
                   </a:solidFill>
@@ -2524,7 +2524,7 @@
             </a:ln>
             <a:extLst>
               <a:ext uri="{91240B29-F687-4f45-9708-019B960494DF}">
-                <a14:hiddenLine xmlns="" xmlns:a14="http://schemas.microsoft.com/office/drawing/2010/main" w="9525">
+                <a14:hiddenLine xmlns:a14="http://schemas.microsoft.com/office/drawing/2010/main" xmlns="" w="9525">
                   <a:solidFill>
                     <a:srgbClr val="000000"/>
                   </a:solidFill>
@@ -2580,7 +2580,7 @@
             </a:ln>
             <a:extLst>
               <a:ext uri="{91240B29-F687-4f45-9708-019B960494DF}">
-                <a14:hiddenLine xmlns="" xmlns:a14="http://schemas.microsoft.com/office/drawing/2010/main" w="9525">
+                <a14:hiddenLine xmlns:a14="http://schemas.microsoft.com/office/drawing/2010/main" xmlns="" w="9525">
                   <a:solidFill>
                     <a:srgbClr val="000000"/>
                   </a:solidFill>
@@ -2670,7 +2670,7 @@
             </a:ln>
             <a:extLst>
               <a:ext uri="{91240B29-F687-4f45-9708-019B960494DF}">
-                <a14:hiddenLine xmlns="" xmlns:a14="http://schemas.microsoft.com/office/drawing/2010/main" w="9525">
+                <a14:hiddenLine xmlns:a14="http://schemas.microsoft.com/office/drawing/2010/main" xmlns="" w="9525">
                   <a:solidFill>
                     <a:srgbClr val="000000"/>
                   </a:solidFill>
@@ -2738,7 +2738,7 @@
             </a:ln>
             <a:extLst>
               <a:ext uri="{91240B29-F687-4f45-9708-019B960494DF}">
-                <a14:hiddenLine xmlns="" xmlns:a14="http://schemas.microsoft.com/office/drawing/2010/main" w="9525">
+                <a14:hiddenLine xmlns:a14="http://schemas.microsoft.com/office/drawing/2010/main" xmlns="" w="9525">
                   <a:solidFill>
                     <a:srgbClr val="000000"/>
                   </a:solidFill>
@@ -2828,7 +2828,7 @@
             </a:ln>
             <a:extLst>
               <a:ext uri="{91240B29-F687-4f45-9708-019B960494DF}">
-                <a14:hiddenLine xmlns="" xmlns:a14="http://schemas.microsoft.com/office/drawing/2010/main" w="9525">
+                <a14:hiddenLine xmlns:a14="http://schemas.microsoft.com/office/drawing/2010/main" xmlns="" w="9525">
                   <a:solidFill>
                     <a:srgbClr val="000000"/>
                   </a:solidFill>
@@ -2896,7 +2896,7 @@
             </a:ln>
             <a:extLst>
               <a:ext uri="{91240B29-F687-4f45-9708-019B960494DF}">
-                <a14:hiddenLine xmlns="" xmlns:a14="http://schemas.microsoft.com/office/drawing/2010/main" w="9525">
+                <a14:hiddenLine xmlns:a14="http://schemas.microsoft.com/office/drawing/2010/main" xmlns="" w="9525">
                   <a:solidFill>
                     <a:srgbClr val="000000"/>
                   </a:solidFill>
@@ -2986,7 +2986,7 @@
             </a:ln>
             <a:extLst>
               <a:ext uri="{91240B29-F687-4f45-9708-019B960494DF}">
-                <a14:hiddenLine xmlns="" xmlns:a14="http://schemas.microsoft.com/office/drawing/2010/main" w="9525">
+                <a14:hiddenLine xmlns:a14="http://schemas.microsoft.com/office/drawing/2010/main" xmlns="" w="9525">
                   <a:solidFill>
                     <a:srgbClr val="000000"/>
                   </a:solidFill>
@@ -3020,7 +3020,7 @@
             </a:ln>
             <a:extLst>
               <a:ext uri="{91240B29-F687-4f45-9708-019B960494DF}">
-                <a14:hiddenLine xmlns="" xmlns:a14="http://schemas.microsoft.com/office/drawing/2010/main" w="9525">
+                <a14:hiddenLine xmlns:a14="http://schemas.microsoft.com/office/drawing/2010/main" xmlns="" w="9525">
                   <a:solidFill>
                     <a:srgbClr val="000000"/>
                   </a:solidFill>
@@ -3110,7 +3110,7 @@
             </a:ln>
             <a:extLst>
               <a:ext uri="{91240B29-F687-4f45-9708-019B960494DF}">
-                <a14:hiddenLine xmlns="" xmlns:a14="http://schemas.microsoft.com/office/drawing/2010/main" w="9525">
+                <a14:hiddenLine xmlns:a14="http://schemas.microsoft.com/office/drawing/2010/main" xmlns="" w="9525">
                   <a:solidFill>
                     <a:srgbClr val="000000"/>
                   </a:solidFill>
@@ -3172,7 +3172,7 @@
             </a:ln>
             <a:extLst>
               <a:ext uri="{91240B29-F687-4f45-9708-019B960494DF}">
-                <a14:hiddenLine xmlns="" xmlns:a14="http://schemas.microsoft.com/office/drawing/2010/main" w="9525">
+                <a14:hiddenLine xmlns:a14="http://schemas.microsoft.com/office/drawing/2010/main" xmlns="" w="9525">
                   <a:solidFill>
                     <a:srgbClr val="000000"/>
                   </a:solidFill>
@@ -3234,7 +3234,7 @@
             </a:ln>
             <a:extLst>
               <a:ext uri="{91240B29-F687-4f45-9708-019B960494DF}">
-                <a14:hiddenLine xmlns="" xmlns:a14="http://schemas.microsoft.com/office/drawing/2010/main" w="9525">
+                <a14:hiddenLine xmlns:a14="http://schemas.microsoft.com/office/drawing/2010/main" xmlns="" w="9525">
                   <a:solidFill>
                     <a:srgbClr val="000000"/>
                   </a:solidFill>
@@ -3324,7 +3324,7 @@
             </a:ln>
             <a:extLst>
               <a:ext uri="{91240B29-F687-4f45-9708-019B960494DF}">
-                <a14:hiddenLine xmlns="" xmlns:a14="http://schemas.microsoft.com/office/drawing/2010/main" w="9525">
+                <a14:hiddenLine xmlns:a14="http://schemas.microsoft.com/office/drawing/2010/main" xmlns="" w="9525">
                   <a:solidFill>
                     <a:srgbClr val="000000"/>
                   </a:solidFill>
@@ -3392,7 +3392,7 @@
             </a:ln>
             <a:extLst>
               <a:ext uri="{91240B29-F687-4f45-9708-019B960494DF}">
-                <a14:hiddenLine xmlns="" xmlns:a14="http://schemas.microsoft.com/office/drawing/2010/main" w="9525">
+                <a14:hiddenLine xmlns:a14="http://schemas.microsoft.com/office/drawing/2010/main" xmlns="" w="9525">
                   <a:solidFill>
                     <a:srgbClr val="000000"/>
                   </a:solidFill>
@@ -3454,7 +3454,7 @@
             </a:ln>
             <a:extLst>
               <a:ext uri="{91240B29-F687-4f45-9708-019B960494DF}">
-                <a14:hiddenLine xmlns="" xmlns:a14="http://schemas.microsoft.com/office/drawing/2010/main" w="9525">
+                <a14:hiddenLine xmlns:a14="http://schemas.microsoft.com/office/drawing/2010/main" xmlns="" w="9525">
                   <a:solidFill>
                     <a:srgbClr val="000000"/>
                   </a:solidFill>
@@ -3544,7 +3544,7 @@
             </a:ln>
             <a:extLst>
               <a:ext uri="{91240B29-F687-4f45-9708-019B960494DF}">
-                <a14:hiddenLine xmlns="" xmlns:a14="http://schemas.microsoft.com/office/drawing/2010/main" w="9525">
+                <a14:hiddenLine xmlns:a14="http://schemas.microsoft.com/office/drawing/2010/main" xmlns="" w="9525">
                   <a:solidFill>
                     <a:srgbClr val="000000"/>
                   </a:solidFill>
@@ -3606,7 +3606,7 @@
             </a:ln>
             <a:extLst>
               <a:ext uri="{91240B29-F687-4f45-9708-019B960494DF}">
-                <a14:hiddenLine xmlns="" xmlns:a14="http://schemas.microsoft.com/office/drawing/2010/main" w="9525">
+                <a14:hiddenLine xmlns:a14="http://schemas.microsoft.com/office/drawing/2010/main" xmlns="" w="9525">
                   <a:solidFill>
                     <a:srgbClr val="000000"/>
                   </a:solidFill>
@@ -3696,7 +3696,7 @@
             </a:ln>
             <a:extLst>
               <a:ext uri="{91240B29-F687-4f45-9708-019B960494DF}">
-                <a14:hiddenLine xmlns="" xmlns:a14="http://schemas.microsoft.com/office/drawing/2010/main" w="9525">
+                <a14:hiddenLine xmlns:a14="http://schemas.microsoft.com/office/drawing/2010/main" xmlns="" w="9525">
                   <a:solidFill>
                     <a:srgbClr val="000000"/>
                   </a:solidFill>
@@ -3758,7 +3758,7 @@
             </a:ln>
             <a:extLst>
               <a:ext uri="{91240B29-F687-4f45-9708-019B960494DF}">
-                <a14:hiddenLine xmlns="" xmlns:a14="http://schemas.microsoft.com/office/drawing/2010/main" w="9525">
+                <a14:hiddenLine xmlns:a14="http://schemas.microsoft.com/office/drawing/2010/main" xmlns="" w="9525">
                   <a:solidFill>
                     <a:srgbClr val="000000"/>
                   </a:solidFill>
@@ -3848,7 +3848,7 @@
             </a:ln>
             <a:extLst>
               <a:ext uri="{91240B29-F687-4f45-9708-019B960494DF}">
-                <a14:hiddenLine xmlns="" xmlns:a14="http://schemas.microsoft.com/office/drawing/2010/main" w="9525">
+                <a14:hiddenLine xmlns:a14="http://schemas.microsoft.com/office/drawing/2010/main" xmlns="" w="9525">
                   <a:solidFill>
                     <a:srgbClr val="000000"/>
                   </a:solidFill>
@@ -3882,7 +3882,7 @@
             </a:ln>
             <a:extLst>
               <a:ext uri="{91240B29-F687-4f45-9708-019B960494DF}">
-                <a14:hiddenLine xmlns="" xmlns:a14="http://schemas.microsoft.com/office/drawing/2010/main" w="9525">
+                <a14:hiddenLine xmlns:a14="http://schemas.microsoft.com/office/drawing/2010/main" xmlns="" w="9525">
                   <a:solidFill>
                     <a:srgbClr val="000000"/>
                   </a:solidFill>
@@ -3947,7 +3947,7 @@
             </a:ln>
             <a:extLst>
               <a:ext uri="{91240B29-F687-4f45-9708-019B960494DF}">
-                <a14:hiddenLine xmlns="" xmlns:a14="http://schemas.microsoft.com/office/drawing/2010/main" w="9525">
+                <a14:hiddenLine xmlns:a14="http://schemas.microsoft.com/office/drawing/2010/main" xmlns="" w="9525">
                   <a:solidFill>
                     <a:srgbClr val="000000"/>
                   </a:solidFill>
@@ -4037,7 +4037,7 @@
             </a:ln>
             <a:extLst>
               <a:ext uri="{91240B29-F687-4f45-9708-019B960494DF}">
-                <a14:hiddenLine xmlns="" xmlns:a14="http://schemas.microsoft.com/office/drawing/2010/main" w="9525">
+                <a14:hiddenLine xmlns:a14="http://schemas.microsoft.com/office/drawing/2010/main" xmlns="" w="9525">
                   <a:solidFill>
                     <a:srgbClr val="000000"/>
                   </a:solidFill>
@@ -4099,7 +4099,7 @@
             </a:ln>
             <a:extLst>
               <a:ext uri="{91240B29-F687-4f45-9708-019B960494DF}">
-                <a14:hiddenLine xmlns="" xmlns:a14="http://schemas.microsoft.com/office/drawing/2010/main" w="9525">
+                <a14:hiddenLine xmlns:a14="http://schemas.microsoft.com/office/drawing/2010/main" xmlns="" w="9525">
                   <a:solidFill>
                     <a:srgbClr val="000000"/>
                   </a:solidFill>
@@ -4189,7 +4189,7 @@
             </a:ln>
             <a:extLst>
               <a:ext uri="{91240B29-F687-4f45-9708-019B960494DF}">
-                <a14:hiddenLine xmlns="" xmlns:a14="http://schemas.microsoft.com/office/drawing/2010/main" w="9525">
+                <a14:hiddenLine xmlns:a14="http://schemas.microsoft.com/office/drawing/2010/main" xmlns="" w="9525">
                   <a:solidFill>
                     <a:srgbClr val="000000"/>
                   </a:solidFill>
@@ -4279,7 +4279,7 @@
             </a:ln>
             <a:extLst>
               <a:ext uri="{91240B29-F687-4f45-9708-019B960494DF}">
-                <a14:hiddenLine xmlns="" xmlns:a14="http://schemas.microsoft.com/office/drawing/2010/main" w="9525">
+                <a14:hiddenLine xmlns:a14="http://schemas.microsoft.com/office/drawing/2010/main" xmlns="" w="9525">
                   <a:solidFill>
                     <a:srgbClr val="000000"/>
                   </a:solidFill>
@@ -4344,7 +4344,7 @@
             </a:ln>
             <a:extLst>
               <a:ext uri="{91240B29-F687-4f45-9708-019B960494DF}">
-                <a14:hiddenLine xmlns="" xmlns:a14="http://schemas.microsoft.com/office/drawing/2010/main" w="9525">
+                <a14:hiddenLine xmlns:a14="http://schemas.microsoft.com/office/drawing/2010/main" xmlns="" w="9525">
                   <a:solidFill>
                     <a:srgbClr val="000000"/>
                   </a:solidFill>
@@ -4406,7 +4406,7 @@
             </a:ln>
             <a:extLst>
               <a:ext uri="{91240B29-F687-4f45-9708-019B960494DF}">
-                <a14:hiddenLine xmlns="" xmlns:a14="http://schemas.microsoft.com/office/drawing/2010/main" w="9525">
+                <a14:hiddenLine xmlns:a14="http://schemas.microsoft.com/office/drawing/2010/main" xmlns="" w="9525">
                   <a:solidFill>
                     <a:srgbClr val="000000"/>
                   </a:solidFill>
@@ -4496,7 +4496,7 @@
             </a:ln>
             <a:extLst>
               <a:ext uri="{91240B29-F687-4f45-9708-019B960494DF}">
-                <a14:hiddenLine xmlns="" xmlns:a14="http://schemas.microsoft.com/office/drawing/2010/main" w="9525">
+                <a14:hiddenLine xmlns:a14="http://schemas.microsoft.com/office/drawing/2010/main" xmlns="" w="9525">
                   <a:solidFill>
                     <a:srgbClr val="000000"/>
                   </a:solidFill>
@@ -4586,7 +4586,7 @@
             </a:ln>
             <a:extLst>
               <a:ext uri="{91240B29-F687-4f45-9708-019B960494DF}">
-                <a14:hiddenLine xmlns="" xmlns:a14="http://schemas.microsoft.com/office/drawing/2010/main" w="9525">
+                <a14:hiddenLine xmlns:a14="http://schemas.microsoft.com/office/drawing/2010/main" xmlns="" w="9525">
                   <a:solidFill>
                     <a:srgbClr val="000000"/>
                   </a:solidFill>
@@ -4648,7 +4648,7 @@
             </a:ln>
             <a:extLst>
               <a:ext uri="{91240B29-F687-4f45-9708-019B960494DF}">
-                <a14:hiddenLine xmlns="" xmlns:a14="http://schemas.microsoft.com/office/drawing/2010/main" w="9525">
+                <a14:hiddenLine xmlns:a14="http://schemas.microsoft.com/office/drawing/2010/main" xmlns="" w="9525">
                   <a:solidFill>
                     <a:srgbClr val="000000"/>
                   </a:solidFill>
@@ -4768,7 +4768,7 @@
             </a:ln>
             <a:extLst>
               <a:ext uri="{91240B29-F687-4f45-9708-019B960494DF}">
-                <a14:hiddenLine xmlns="" xmlns:a14="http://schemas.microsoft.com/office/drawing/2010/main" w="9525">
+                <a14:hiddenLine xmlns:a14="http://schemas.microsoft.com/office/drawing/2010/main" xmlns="" w="9525">
                   <a:solidFill>
                     <a:srgbClr val="000000"/>
                   </a:solidFill>
@@ -4836,7 +4836,7 @@
             </a:ln>
             <a:extLst>
               <a:ext uri="{91240B29-F687-4f45-9708-019B960494DF}">
-                <a14:hiddenLine xmlns="" xmlns:a14="http://schemas.microsoft.com/office/drawing/2010/main" w="9525">
+                <a14:hiddenLine xmlns:a14="http://schemas.microsoft.com/office/drawing/2010/main" xmlns="" w="9525">
                   <a:solidFill>
                     <a:srgbClr val="000000"/>
                   </a:solidFill>
@@ -4926,7 +4926,7 @@
             </a:ln>
             <a:extLst>
               <a:ext uri="{91240B29-F687-4f45-9708-019B960494DF}">
-                <a14:hiddenLine xmlns="" xmlns:a14="http://schemas.microsoft.com/office/drawing/2010/main" w="9525">
+                <a14:hiddenLine xmlns:a14="http://schemas.microsoft.com/office/drawing/2010/main" xmlns="" w="9525">
                   <a:solidFill>
                     <a:srgbClr val="000000"/>
                   </a:solidFill>
@@ -5066,7 +5066,7 @@
           <a:p>
             <a:fld id="{F34B6E3E-06F4-4326-ABDB-61EE022A2F5F}" type="datetimeFigureOut">
               <a:rPr lang="en-US" smtClean="0"/>
-              <a:t>5/19/2020</a:t>
+              <a:t>5/21/2020</a:t>
             </a:fld>
             <a:endParaRPr lang="en-US"/>
           </a:p>
@@ -5333,7 +5333,7 @@
           <a:p>
             <a:fld id="{F34B6E3E-06F4-4326-ABDB-61EE022A2F5F}" type="datetimeFigureOut">
               <a:rPr lang="en-US" smtClean="0"/>
-              <a:t>5/19/2020</a:t>
+              <a:t>5/21/2020</a:t>
             </a:fld>
             <a:endParaRPr lang="en-US"/>
           </a:p>
@@ -5529,7 +5529,7 @@
           <a:p>
             <a:fld id="{F34B6E3E-06F4-4326-ABDB-61EE022A2F5F}" type="datetimeFigureOut">
               <a:rPr lang="en-US" smtClean="0"/>
-              <a:t>5/19/2020</a:t>
+              <a:t>5/21/2020</a:t>
             </a:fld>
             <a:endParaRPr lang="en-US"/>
           </a:p>
@@ -5792,7 +5792,7 @@
           <a:p>
             <a:fld id="{F34B6E3E-06F4-4326-ABDB-61EE022A2F5F}" type="datetimeFigureOut">
               <a:rPr lang="en-US" smtClean="0"/>
-              <a:t>5/19/2020</a:t>
+              <a:t>5/21/2020</a:t>
             </a:fld>
             <a:endParaRPr lang="en-US"/>
           </a:p>
@@ -6226,7 +6226,7 @@
           <a:p>
             <a:fld id="{F34B6E3E-06F4-4326-ABDB-61EE022A2F5F}" type="datetimeFigureOut">
               <a:rPr lang="en-US" smtClean="0"/>
-              <a:t>5/19/2020</a:t>
+              <a:t>5/21/2020</a:t>
             </a:fld>
             <a:endParaRPr lang="en-US"/>
           </a:p>
@@ -6772,7 +6772,7 @@
           <a:p>
             <a:fld id="{F34B6E3E-06F4-4326-ABDB-61EE022A2F5F}" type="datetimeFigureOut">
               <a:rPr lang="en-US" smtClean="0"/>
-              <a:t>5/19/2020</a:t>
+              <a:t>5/21/2020</a:t>
             </a:fld>
             <a:endParaRPr lang="en-US"/>
           </a:p>
@@ -7492,7 +7492,7 @@
           <a:p>
             <a:fld id="{F34B6E3E-06F4-4326-ABDB-61EE022A2F5F}" type="datetimeFigureOut">
               <a:rPr lang="en-US" smtClean="0"/>
-              <a:t>5/19/2020</a:t>
+              <a:t>5/21/2020</a:t>
             </a:fld>
             <a:endParaRPr lang="en-US"/>
           </a:p>
@@ -7662,7 +7662,7 @@
           <a:p>
             <a:fld id="{F34B6E3E-06F4-4326-ABDB-61EE022A2F5F}" type="datetimeFigureOut">
               <a:rPr lang="en-US" smtClean="0"/>
-              <a:t>5/19/2020</a:t>
+              <a:t>5/21/2020</a:t>
             </a:fld>
             <a:endParaRPr lang="en-US"/>
           </a:p>
@@ -7842,7 +7842,7 @@
           <a:p>
             <a:fld id="{F34B6E3E-06F4-4326-ABDB-61EE022A2F5F}" type="datetimeFigureOut">
               <a:rPr lang="en-US" smtClean="0"/>
-              <a:t>5/19/2020</a:t>
+              <a:t>5/21/2020</a:t>
             </a:fld>
             <a:endParaRPr lang="en-US"/>
           </a:p>
@@ -8510,7 +8510,7 @@
           <a:p>
             <a:fld id="{F34B6E3E-06F4-4326-ABDB-61EE022A2F5F}" type="datetimeFigureOut">
               <a:rPr lang="en-US" smtClean="0"/>
-              <a:t>5/19/2020</a:t>
+              <a:t>5/21/2020</a:t>
             </a:fld>
             <a:endParaRPr lang="en-US"/>
           </a:p>
@@ -8760,7 +8760,7 @@
           <a:p>
             <a:fld id="{F34B6E3E-06F4-4326-ABDB-61EE022A2F5F}" type="datetimeFigureOut">
               <a:rPr lang="en-US" smtClean="0"/>
-              <a:t>5/19/2020</a:t>
+              <a:t>5/21/2020</a:t>
             </a:fld>
             <a:endParaRPr lang="en-US"/>
           </a:p>
@@ -8992,7 +8992,7 @@
           <a:p>
             <a:fld id="{F34B6E3E-06F4-4326-ABDB-61EE022A2F5F}" type="datetimeFigureOut">
               <a:rPr lang="en-US" smtClean="0"/>
-              <a:t>5/19/2020</a:t>
+              <a:t>5/21/2020</a:t>
             </a:fld>
             <a:endParaRPr lang="en-US"/>
           </a:p>
@@ -9373,7 +9373,7 @@
           <a:p>
             <a:fld id="{F34B6E3E-06F4-4326-ABDB-61EE022A2F5F}" type="datetimeFigureOut">
               <a:rPr lang="en-US" smtClean="0"/>
-              <a:t>5/19/2020</a:t>
+              <a:t>5/21/2020</a:t>
             </a:fld>
             <a:endParaRPr lang="en-US"/>
           </a:p>
@@ -9491,7 +9491,7 @@
           <a:p>
             <a:fld id="{F34B6E3E-06F4-4326-ABDB-61EE022A2F5F}" type="datetimeFigureOut">
               <a:rPr lang="en-US" smtClean="0"/>
-              <a:t>5/19/2020</a:t>
+              <a:t>5/21/2020</a:t>
             </a:fld>
             <a:endParaRPr lang="en-US"/>
           </a:p>
@@ -9586,7 +9586,7 @@
           <a:p>
             <a:fld id="{F34B6E3E-06F4-4326-ABDB-61EE022A2F5F}" type="datetimeFigureOut">
               <a:rPr lang="en-US" smtClean="0"/>
-              <a:t>5/19/2020</a:t>
+              <a:t>5/21/2020</a:t>
             </a:fld>
             <a:endParaRPr lang="en-US"/>
           </a:p>
@@ -9835,7 +9835,7 @@
           <a:p>
             <a:fld id="{F34B6E3E-06F4-4326-ABDB-61EE022A2F5F}" type="datetimeFigureOut">
               <a:rPr lang="en-US" smtClean="0"/>
-              <a:t>5/19/2020</a:t>
+              <a:t>5/21/2020</a:t>
             </a:fld>
             <a:endParaRPr lang="en-US"/>
           </a:p>
@@ -10115,7 +10115,7 @@
           <a:p>
             <a:fld id="{F34B6E3E-06F4-4326-ABDB-61EE022A2F5F}" type="datetimeFigureOut">
               <a:rPr lang="en-US" smtClean="0"/>
-              <a:t>5/19/2020</a:t>
+              <a:t>5/21/2020</a:t>
             </a:fld>
             <a:endParaRPr lang="en-US"/>
           </a:p>
@@ -10231,7 +10231,7 @@
           <a:noFill/>
           <a:extLst>
             <a:ext uri="{909E8E84-426E-40dd-AFC4-6F175D3DCCD1}">
-              <a14:hiddenFill xmlns="" xmlns:a14="http://schemas.microsoft.com/office/drawing/2010/main">
+              <a14:hiddenFill xmlns:a14="http://schemas.microsoft.com/office/drawing/2010/main" xmlns="">
                 <a:solidFill>
                   <a:srgbClr val="FFFFFF"/>
                 </a:solidFill>
@@ -10305,7 +10305,7 @@
               </a:ln>
               <a:extLst>
                 <a:ext uri="{91240B29-F687-4f45-9708-019B960494DF}">
-                  <a14:hiddenLine xmlns="" xmlns:a14="http://schemas.microsoft.com/office/drawing/2010/main" w="9525">
+                  <a14:hiddenLine xmlns:a14="http://schemas.microsoft.com/office/drawing/2010/main" xmlns="" w="9525">
                     <a:solidFill>
                       <a:srgbClr val="000000"/>
                     </a:solidFill>
@@ -10395,7 +10395,7 @@
               </a:ln>
               <a:extLst>
                 <a:ext uri="{91240B29-F687-4f45-9708-019B960494DF}">
-                  <a14:hiddenLine xmlns="" xmlns:a14="http://schemas.microsoft.com/office/drawing/2010/main" w="9525">
+                  <a14:hiddenLine xmlns:a14="http://schemas.microsoft.com/office/drawing/2010/main" xmlns="" w="9525">
                     <a:solidFill>
                       <a:srgbClr val="000000"/>
                     </a:solidFill>
@@ -10485,7 +10485,7 @@
               </a:ln>
               <a:extLst>
                 <a:ext uri="{91240B29-F687-4f45-9708-019B960494DF}">
-                  <a14:hiddenLine xmlns="" xmlns:a14="http://schemas.microsoft.com/office/drawing/2010/main" w="9525">
+                  <a14:hiddenLine xmlns:a14="http://schemas.microsoft.com/office/drawing/2010/main" xmlns="" w="9525">
                     <a:solidFill>
                       <a:srgbClr val="000000"/>
                     </a:solidFill>
@@ -10547,7 +10547,7 @@
               </a:ln>
               <a:extLst>
                 <a:ext uri="{91240B29-F687-4f45-9708-019B960494DF}">
-                  <a14:hiddenLine xmlns="" xmlns:a14="http://schemas.microsoft.com/office/drawing/2010/main" w="9525">
+                  <a14:hiddenLine xmlns:a14="http://schemas.microsoft.com/office/drawing/2010/main" xmlns="" w="9525">
                     <a:solidFill>
                       <a:srgbClr val="000000"/>
                     </a:solidFill>
@@ -10637,7 +10637,7 @@
               </a:ln>
               <a:extLst>
                 <a:ext uri="{91240B29-F687-4f45-9708-019B960494DF}">
-                  <a14:hiddenLine xmlns="" xmlns:a14="http://schemas.microsoft.com/office/drawing/2010/main" w="9525">
+                  <a14:hiddenLine xmlns:a14="http://schemas.microsoft.com/office/drawing/2010/main" xmlns="" w="9525">
                     <a:solidFill>
                       <a:srgbClr val="000000"/>
                     </a:solidFill>
@@ -10699,7 +10699,7 @@
               </a:ln>
               <a:extLst>
                 <a:ext uri="{91240B29-F687-4f45-9708-019B960494DF}">
-                  <a14:hiddenLine xmlns="" xmlns:a14="http://schemas.microsoft.com/office/drawing/2010/main" w="9525">
+                  <a14:hiddenLine xmlns:a14="http://schemas.microsoft.com/office/drawing/2010/main" xmlns="" w="9525">
                     <a:solidFill>
                       <a:srgbClr val="000000"/>
                     </a:solidFill>
@@ -10761,7 +10761,7 @@
               </a:ln>
               <a:extLst>
                 <a:ext uri="{91240B29-F687-4f45-9708-019B960494DF}">
-                  <a14:hiddenLine xmlns="" xmlns:a14="http://schemas.microsoft.com/office/drawing/2010/main" w="9525">
+                  <a14:hiddenLine xmlns:a14="http://schemas.microsoft.com/office/drawing/2010/main" xmlns="" w="9525">
                     <a:solidFill>
                       <a:srgbClr val="000000"/>
                     </a:solidFill>
@@ -10851,7 +10851,7 @@
               </a:ln>
               <a:extLst>
                 <a:ext uri="{91240B29-F687-4f45-9708-019B960494DF}">
-                  <a14:hiddenLine xmlns="" xmlns:a14="http://schemas.microsoft.com/office/drawing/2010/main" w="9525">
+                  <a14:hiddenLine xmlns:a14="http://schemas.microsoft.com/office/drawing/2010/main" xmlns="" w="9525">
                     <a:solidFill>
                       <a:srgbClr val="000000"/>
                     </a:solidFill>
@@ -10941,7 +10941,7 @@
               </a:ln>
               <a:extLst>
                 <a:ext uri="{91240B29-F687-4f45-9708-019B960494DF}">
-                  <a14:hiddenLine xmlns="" xmlns:a14="http://schemas.microsoft.com/office/drawing/2010/main" w="9525">
+                  <a14:hiddenLine xmlns:a14="http://schemas.microsoft.com/office/drawing/2010/main" xmlns="" w="9525">
                     <a:solidFill>
                       <a:srgbClr val="000000"/>
                     </a:solidFill>
@@ -11003,7 +11003,7 @@
               </a:ln>
               <a:extLst>
                 <a:ext uri="{91240B29-F687-4f45-9708-019B960494DF}">
-                  <a14:hiddenLine xmlns="" xmlns:a14="http://schemas.microsoft.com/office/drawing/2010/main" w="9525">
+                  <a14:hiddenLine xmlns:a14="http://schemas.microsoft.com/office/drawing/2010/main" xmlns="" w="9525">
                     <a:solidFill>
                       <a:srgbClr val="000000"/>
                     </a:solidFill>
@@ -11113,7 +11113,7 @@
               </a:ln>
               <a:extLst>
                 <a:ext uri="{91240B29-F687-4f45-9708-019B960494DF}">
-                  <a14:hiddenLine xmlns="" xmlns:a14="http://schemas.microsoft.com/office/drawing/2010/main" w="9525">
+                  <a14:hiddenLine xmlns:a14="http://schemas.microsoft.com/office/drawing/2010/main" xmlns="" w="9525">
                     <a:solidFill>
                       <a:srgbClr val="000000"/>
                     </a:solidFill>
@@ -11197,7 +11197,7 @@
               </a:ln>
               <a:extLst>
                 <a:ext uri="{91240B29-F687-4f45-9708-019B960494DF}">
-                  <a14:hiddenLine xmlns="" xmlns:a14="http://schemas.microsoft.com/office/drawing/2010/main" w="9525">
+                  <a14:hiddenLine xmlns:a14="http://schemas.microsoft.com/office/drawing/2010/main" xmlns="" w="9525">
                     <a:solidFill>
                       <a:srgbClr val="000000"/>
                     </a:solidFill>
@@ -11259,7 +11259,7 @@
               </a:ln>
               <a:extLst>
                 <a:ext uri="{91240B29-F687-4f45-9708-019B960494DF}">
-                  <a14:hiddenLine xmlns="" xmlns:a14="http://schemas.microsoft.com/office/drawing/2010/main" w="9525">
+                  <a14:hiddenLine xmlns:a14="http://schemas.microsoft.com/office/drawing/2010/main" xmlns="" w="9525">
                     <a:solidFill>
                       <a:srgbClr val="000000"/>
                     </a:solidFill>
@@ -11321,7 +11321,7 @@
               </a:ln>
               <a:extLst>
                 <a:ext uri="{91240B29-F687-4f45-9708-019B960494DF}">
-                  <a14:hiddenLine xmlns="" xmlns:a14="http://schemas.microsoft.com/office/drawing/2010/main" w="9525">
+                  <a14:hiddenLine xmlns:a14="http://schemas.microsoft.com/office/drawing/2010/main" xmlns="" w="9525">
                     <a:solidFill>
                       <a:srgbClr val="000000"/>
                     </a:solidFill>
@@ -11411,7 +11411,7 @@
               </a:ln>
               <a:extLst>
                 <a:ext uri="{91240B29-F687-4f45-9708-019B960494DF}">
-                  <a14:hiddenLine xmlns="" xmlns:a14="http://schemas.microsoft.com/office/drawing/2010/main" w="9525">
+                  <a14:hiddenLine xmlns:a14="http://schemas.microsoft.com/office/drawing/2010/main" xmlns="" w="9525">
                     <a:solidFill>
                       <a:srgbClr val="000000"/>
                     </a:solidFill>
@@ -11445,7 +11445,7 @@
               </a:ln>
               <a:extLst>
                 <a:ext uri="{91240B29-F687-4f45-9708-019B960494DF}">
-                  <a14:hiddenLine xmlns="" xmlns:a14="http://schemas.microsoft.com/office/drawing/2010/main" w="9525">
+                  <a14:hiddenLine xmlns:a14="http://schemas.microsoft.com/office/drawing/2010/main" xmlns="" w="9525">
                     <a:solidFill>
                       <a:srgbClr val="000000"/>
                     </a:solidFill>
@@ -11510,7 +11510,7 @@
               </a:ln>
               <a:extLst>
                 <a:ext uri="{91240B29-F687-4f45-9708-019B960494DF}">
-                  <a14:hiddenLine xmlns="" xmlns:a14="http://schemas.microsoft.com/office/drawing/2010/main" w="9525">
+                  <a14:hiddenLine xmlns:a14="http://schemas.microsoft.com/office/drawing/2010/main" xmlns="" w="9525">
                     <a:solidFill>
                       <a:srgbClr val="000000"/>
                     </a:solidFill>
@@ -11600,7 +11600,7 @@
               </a:ln>
               <a:extLst>
                 <a:ext uri="{91240B29-F687-4f45-9708-019B960494DF}">
-                  <a14:hiddenLine xmlns="" xmlns:a14="http://schemas.microsoft.com/office/drawing/2010/main" w="9525">
+                  <a14:hiddenLine xmlns:a14="http://schemas.microsoft.com/office/drawing/2010/main" xmlns="" w="9525">
                     <a:solidFill>
                       <a:srgbClr val="000000"/>
                     </a:solidFill>
@@ -11662,7 +11662,7 @@
               </a:ln>
               <a:extLst>
                 <a:ext uri="{91240B29-F687-4f45-9708-019B960494DF}">
-                  <a14:hiddenLine xmlns="" xmlns:a14="http://schemas.microsoft.com/office/drawing/2010/main" w="9525">
+                  <a14:hiddenLine xmlns:a14="http://schemas.microsoft.com/office/drawing/2010/main" xmlns="" w="9525">
                     <a:solidFill>
                       <a:srgbClr val="000000"/>
                     </a:solidFill>
@@ -11752,7 +11752,7 @@
               </a:ln>
               <a:extLst>
                 <a:ext uri="{91240B29-F687-4f45-9708-019B960494DF}">
-                  <a14:hiddenLine xmlns="" xmlns:a14="http://schemas.microsoft.com/office/drawing/2010/main" w="9525">
+                  <a14:hiddenLine xmlns:a14="http://schemas.microsoft.com/office/drawing/2010/main" xmlns="" w="9525">
                     <a:solidFill>
                       <a:srgbClr val="000000"/>
                     </a:solidFill>
@@ -11817,7 +11817,7 @@
               </a:ln>
               <a:extLst>
                 <a:ext uri="{91240B29-F687-4f45-9708-019B960494DF}">
-                  <a14:hiddenLine xmlns="" xmlns:a14="http://schemas.microsoft.com/office/drawing/2010/main" w="9525">
+                  <a14:hiddenLine xmlns:a14="http://schemas.microsoft.com/office/drawing/2010/main" xmlns="" w="9525">
                     <a:solidFill>
                       <a:srgbClr val="000000"/>
                     </a:solidFill>
@@ -11879,7 +11879,7 @@
               </a:ln>
               <a:extLst>
                 <a:ext uri="{91240B29-F687-4f45-9708-019B960494DF}">
-                  <a14:hiddenLine xmlns="" xmlns:a14="http://schemas.microsoft.com/office/drawing/2010/main" w="9525">
+                  <a14:hiddenLine xmlns:a14="http://schemas.microsoft.com/office/drawing/2010/main" xmlns="" w="9525">
                     <a:solidFill>
                       <a:srgbClr val="000000"/>
                     </a:solidFill>
@@ -11969,7 +11969,7 @@
               </a:ln>
               <a:extLst>
                 <a:ext uri="{91240B29-F687-4f45-9708-019B960494DF}">
-                  <a14:hiddenLine xmlns="" xmlns:a14="http://schemas.microsoft.com/office/drawing/2010/main" w="9525">
+                  <a14:hiddenLine xmlns:a14="http://schemas.microsoft.com/office/drawing/2010/main" xmlns="" w="9525">
                     <a:solidFill>
                       <a:srgbClr val="000000"/>
                     </a:solidFill>
@@ -12059,7 +12059,7 @@
               </a:ln>
               <a:extLst>
                 <a:ext uri="{91240B29-F687-4f45-9708-019B960494DF}">
-                  <a14:hiddenLine xmlns="" xmlns:a14="http://schemas.microsoft.com/office/drawing/2010/main" w="9525">
+                  <a14:hiddenLine xmlns:a14="http://schemas.microsoft.com/office/drawing/2010/main" xmlns="" w="9525">
                     <a:solidFill>
                       <a:srgbClr val="000000"/>
                     </a:solidFill>
@@ -12124,7 +12124,7 @@
               </a:ln>
               <a:extLst>
                 <a:ext uri="{91240B29-F687-4f45-9708-019B960494DF}">
-                  <a14:hiddenLine xmlns="" xmlns:a14="http://schemas.microsoft.com/office/drawing/2010/main" w="9525">
+                  <a14:hiddenLine xmlns:a14="http://schemas.microsoft.com/office/drawing/2010/main" xmlns="" w="9525">
                     <a:solidFill>
                       <a:srgbClr val="000000"/>
                     </a:solidFill>
@@ -12244,7 +12244,7 @@
               </a:ln>
               <a:extLst>
                 <a:ext uri="{91240B29-F687-4f45-9708-019B960494DF}">
-                  <a14:hiddenLine xmlns="" xmlns:a14="http://schemas.microsoft.com/office/drawing/2010/main" w="9525">
+                  <a14:hiddenLine xmlns:a14="http://schemas.microsoft.com/office/drawing/2010/main" xmlns="" w="9525">
                     <a:solidFill>
                       <a:srgbClr val="000000"/>
                     </a:solidFill>
@@ -12342,7 +12342,7 @@
               </a:ln>
               <a:extLst>
                 <a:ext uri="{91240B29-F687-4f45-9708-019B960494DF}">
-                  <a14:hiddenLine xmlns="" xmlns:a14="http://schemas.microsoft.com/office/drawing/2010/main" w="9525">
+                  <a14:hiddenLine xmlns:a14="http://schemas.microsoft.com/office/drawing/2010/main" xmlns="" w="9525">
                     <a:solidFill>
                       <a:srgbClr val="000000"/>
                     </a:solidFill>
@@ -12457,7 +12457,7 @@
               </a:ln>
               <a:extLst>
                 <a:ext uri="{91240B29-F687-4f45-9708-019B960494DF}">
-                  <a14:hiddenLine xmlns="" xmlns:a14="http://schemas.microsoft.com/office/drawing/2010/main" w="9525">
+                  <a14:hiddenLine xmlns:a14="http://schemas.microsoft.com/office/drawing/2010/main" xmlns="" w="9525">
                     <a:solidFill>
                       <a:srgbClr val="000000"/>
                     </a:solidFill>
@@ -12547,7 +12547,7 @@
               </a:ln>
               <a:extLst>
                 <a:ext uri="{91240B29-F687-4f45-9708-019B960494DF}">
-                  <a14:hiddenLine xmlns="" xmlns:a14="http://schemas.microsoft.com/office/drawing/2010/main" w="9525">
+                  <a14:hiddenLine xmlns:a14="http://schemas.microsoft.com/office/drawing/2010/main" xmlns="" w="9525">
                     <a:solidFill>
                       <a:srgbClr val="000000"/>
                     </a:solidFill>
@@ -12612,7 +12612,7 @@
               </a:ln>
               <a:extLst>
                 <a:ext uri="{91240B29-F687-4f45-9708-019B960494DF}">
-                  <a14:hiddenLine xmlns="" xmlns:a14="http://schemas.microsoft.com/office/drawing/2010/main" w="9525">
+                  <a14:hiddenLine xmlns:a14="http://schemas.microsoft.com/office/drawing/2010/main" xmlns="" w="9525">
                     <a:solidFill>
                       <a:srgbClr val="000000"/>
                     </a:solidFill>
@@ -12702,7 +12702,7 @@
               </a:ln>
               <a:extLst>
                 <a:ext uri="{91240B29-F687-4f45-9708-019B960494DF}">
-                  <a14:hiddenLine xmlns="" xmlns:a14="http://schemas.microsoft.com/office/drawing/2010/main" w="9525">
+                  <a14:hiddenLine xmlns:a14="http://schemas.microsoft.com/office/drawing/2010/main" xmlns="" w="9525">
                     <a:solidFill>
                       <a:srgbClr val="000000"/>
                     </a:solidFill>
@@ -12770,7 +12770,7 @@
               </a:ln>
               <a:extLst>
                 <a:ext uri="{91240B29-F687-4f45-9708-019B960494DF}">
-                  <a14:hiddenLine xmlns="" xmlns:a14="http://schemas.microsoft.com/office/drawing/2010/main" w="9525">
+                  <a14:hiddenLine xmlns:a14="http://schemas.microsoft.com/office/drawing/2010/main" xmlns="" w="9525">
                     <a:solidFill>
                       <a:srgbClr val="000000"/>
                     </a:solidFill>
@@ -12860,7 +12860,7 @@
               </a:ln>
               <a:extLst>
                 <a:ext uri="{91240B29-F687-4f45-9708-019B960494DF}">
-                  <a14:hiddenLine xmlns="" xmlns:a14="http://schemas.microsoft.com/office/drawing/2010/main" w="9525">
+                  <a14:hiddenLine xmlns:a14="http://schemas.microsoft.com/office/drawing/2010/main" xmlns="" w="9525">
                     <a:solidFill>
                       <a:srgbClr val="000000"/>
                     </a:solidFill>
@@ -12928,7 +12928,7 @@
               </a:ln>
               <a:extLst>
                 <a:ext uri="{91240B29-F687-4f45-9708-019B960494DF}">
-                  <a14:hiddenLine xmlns="" xmlns:a14="http://schemas.microsoft.com/office/drawing/2010/main" w="9525">
+                  <a14:hiddenLine xmlns:a14="http://schemas.microsoft.com/office/drawing/2010/main" xmlns="" w="9525">
                     <a:solidFill>
                       <a:srgbClr val="000000"/>
                     </a:solidFill>
@@ -13018,7 +13018,7 @@
               </a:ln>
               <a:extLst>
                 <a:ext uri="{91240B29-F687-4f45-9708-019B960494DF}">
-                  <a14:hiddenLine xmlns="" xmlns:a14="http://schemas.microsoft.com/office/drawing/2010/main" w="9525">
+                  <a14:hiddenLine xmlns:a14="http://schemas.microsoft.com/office/drawing/2010/main" xmlns="" w="9525">
                     <a:solidFill>
                       <a:srgbClr val="000000"/>
                     </a:solidFill>
@@ -13052,7 +13052,7 @@
               </a:ln>
               <a:extLst>
                 <a:ext uri="{91240B29-F687-4f45-9708-019B960494DF}">
-                  <a14:hiddenLine xmlns="" xmlns:a14="http://schemas.microsoft.com/office/drawing/2010/main" w="9525">
+                  <a14:hiddenLine xmlns:a14="http://schemas.microsoft.com/office/drawing/2010/main" xmlns="" w="9525">
                     <a:solidFill>
                       <a:srgbClr val="000000"/>
                     </a:solidFill>
@@ -13192,7 +13192,7 @@
           <a:p>
             <a:fld id="{F34B6E3E-06F4-4326-ABDB-61EE022A2F5F}" type="datetimeFigureOut">
               <a:rPr lang="en-US" smtClean="0"/>
-              <a:t>5/19/2020</a:t>
+              <a:t>5/21/2020</a:t>
             </a:fld>
             <a:endParaRPr lang="en-US"/>
           </a:p>
@@ -16104,7 +16104,7 @@
             </a:pPr>
             <a:r>
               <a:rPr lang="en-US" dirty="0"/>
-              <a:t>No default LINQ</a:t>
+              <a:t>No default LINQ, no JOIN support</a:t>
             </a:r>
           </a:p>
           <a:p>
@@ -21084,7 +21084,7 @@
             </a:r>
             <a:r>
               <a:rPr lang="en-US" sz="2000" b="1" dirty="0"/>
-              <a:t>, Darin, Stefan, </a:t>
+              <a:t>, Darin, Stefan</a:t>
             </a:r>
           </a:p>
           <a:p>

</xml_diff>